<commit_message>
fixed draft to submit
</commit_message>
<xml_diff>
--- a/Thesis-presentation.pptx
+++ b/Thesis-presentation.pptx
@@ -227,14 +227,14 @@
           <a:effectLst/>
           <a:extLst>
             <a:ext uri="{909E8E84-426E-40dd-AFC4-6F175D3DCCD1}">
-              <a14:hiddenFill xmlns="" xmlns:a14="http://schemas.microsoft.com/office/drawing/2010/main">
+              <a14:hiddenFill xmlns:a14="http://schemas.microsoft.com/office/drawing/2010/main" xmlns="">
                 <a:solidFill>
                   <a:schemeClr val="accent1"/>
                 </a:solidFill>
               </a14:hiddenFill>
             </a:ext>
             <a:ext uri="{91240B29-F687-4f45-9708-019B960494DF}">
-              <a14:hiddenLine xmlns="" xmlns:a14="http://schemas.microsoft.com/office/drawing/2010/main" w="9525">
+              <a14:hiddenLine xmlns:a14="http://schemas.microsoft.com/office/drawing/2010/main" xmlns="" w="9525">
                 <a:solidFill>
                   <a:schemeClr val="tx1"/>
                 </a:solidFill>
@@ -244,7 +244,7 @@
               </a14:hiddenLine>
             </a:ext>
             <a:ext uri="{AF507438-7753-43e0-B8FC-AC1667EBCBE1}">
-              <a14:hiddenEffects xmlns="" xmlns:a14="http://schemas.microsoft.com/office/drawing/2010/main">
+              <a14:hiddenEffects xmlns:a14="http://schemas.microsoft.com/office/drawing/2010/main" xmlns="">
                 <a:effectLst>
                   <a:outerShdw blurRad="63500" dist="38099" dir="2700000" algn="ctr" rotWithShape="0">
                     <a:schemeClr val="bg2">
@@ -255,7 +255,7 @@
               </a14:hiddenEffects>
             </a:ext>
             <a:ext uri="{FAA26D3D-D897-4be2-8F04-BA451C77F1D7}">
-              <ma14:placeholderFlag xmlns="" xmlns:ma14="http://schemas.microsoft.com/office/mac/drawingml/2011/main" val="1"/>
+              <ma14:placeholderFlag xmlns:ma14="http://schemas.microsoft.com/office/mac/drawingml/2011/main" xmlns="" val="1"/>
             </a:ext>
           </a:extLst>
         </p:spPr>
@@ -300,14 +300,14 @@
           <a:effectLst/>
           <a:extLst>
             <a:ext uri="{909E8E84-426E-40dd-AFC4-6F175D3DCCD1}">
-              <a14:hiddenFill xmlns="" xmlns:a14="http://schemas.microsoft.com/office/drawing/2010/main">
+              <a14:hiddenFill xmlns:a14="http://schemas.microsoft.com/office/drawing/2010/main" xmlns="">
                 <a:solidFill>
                   <a:schemeClr val="accent1"/>
                 </a:solidFill>
               </a14:hiddenFill>
             </a:ext>
             <a:ext uri="{91240B29-F687-4f45-9708-019B960494DF}">
-              <a14:hiddenLine xmlns="" xmlns:a14="http://schemas.microsoft.com/office/drawing/2010/main" w="9525">
+              <a14:hiddenLine xmlns:a14="http://schemas.microsoft.com/office/drawing/2010/main" xmlns="" w="9525">
                 <a:solidFill>
                   <a:schemeClr val="tx1"/>
                 </a:solidFill>
@@ -317,7 +317,7 @@
               </a14:hiddenLine>
             </a:ext>
             <a:ext uri="{AF507438-7753-43e0-B8FC-AC1667EBCBE1}">
-              <a14:hiddenEffects xmlns="" xmlns:a14="http://schemas.microsoft.com/office/drawing/2010/main">
+              <a14:hiddenEffects xmlns:a14="http://schemas.microsoft.com/office/drawing/2010/main" xmlns="">
                 <a:effectLst>
                   <a:outerShdw blurRad="63500" dist="38099" dir="2700000" algn="ctr" rotWithShape="0">
                     <a:schemeClr val="bg2">
@@ -328,7 +328,7 @@
               </a14:hiddenEffects>
             </a:ext>
             <a:ext uri="{FAA26D3D-D897-4be2-8F04-BA451C77F1D7}">
-              <ma14:placeholderFlag xmlns="" xmlns:ma14="http://schemas.microsoft.com/office/mac/drawingml/2011/main" val="1"/>
+              <ma14:placeholderFlag xmlns:ma14="http://schemas.microsoft.com/office/mac/drawingml/2011/main" xmlns="" val="1"/>
             </a:ext>
           </a:extLst>
         </p:spPr>
@@ -378,7 +378,7 @@
           <a:effectLst/>
           <a:extLst>
             <a:ext uri="{AF507438-7753-43e0-B8FC-AC1667EBCBE1}">
-              <a14:hiddenEffects xmlns="" xmlns:a14="http://schemas.microsoft.com/office/drawing/2010/main">
+              <a14:hiddenEffects xmlns:a14="http://schemas.microsoft.com/office/drawing/2010/main" xmlns="">
                 <a:effectLst>
                   <a:outerShdw blurRad="63500" dist="38099" dir="2700000" algn="ctr" rotWithShape="0">
                     <a:srgbClr val="000000">
@@ -389,7 +389,7 @@
               </a14:hiddenEffects>
             </a:ext>
             <a:ext uri="{53640926-AAD7-44d8-BBD7-CCE9431645EC}">
-              <a14:shadowObscured xmlns="" xmlns:a14="http://schemas.microsoft.com/office/drawing/2010/main" val="1"/>
+              <a14:shadowObscured xmlns:a14="http://schemas.microsoft.com/office/drawing/2010/main" xmlns="" val="1"/>
             </a:ext>
           </a:extLst>
         </p:spPr>
@@ -419,14 +419,14 @@
           <a:effectLst/>
           <a:extLst>
             <a:ext uri="{909E8E84-426E-40dd-AFC4-6F175D3DCCD1}">
-              <a14:hiddenFill xmlns="" xmlns:a14="http://schemas.microsoft.com/office/drawing/2010/main">
+              <a14:hiddenFill xmlns:a14="http://schemas.microsoft.com/office/drawing/2010/main" xmlns="">
                 <a:solidFill>
                   <a:schemeClr val="accent1"/>
                 </a:solidFill>
               </a14:hiddenFill>
             </a:ext>
             <a:ext uri="{91240B29-F687-4f45-9708-019B960494DF}">
-              <a14:hiddenLine xmlns="" xmlns:a14="http://schemas.microsoft.com/office/drawing/2010/main" w="9525">
+              <a14:hiddenLine xmlns:a14="http://schemas.microsoft.com/office/drawing/2010/main" xmlns="" w="9525">
                 <a:solidFill>
                   <a:schemeClr val="tx1"/>
                 </a:solidFill>
@@ -436,7 +436,7 @@
               </a14:hiddenLine>
             </a:ext>
             <a:ext uri="{AF507438-7753-43e0-B8FC-AC1667EBCBE1}">
-              <a14:hiddenEffects xmlns="" xmlns:a14="http://schemas.microsoft.com/office/drawing/2010/main">
+              <a14:hiddenEffects xmlns:a14="http://schemas.microsoft.com/office/drawing/2010/main" xmlns="">
                 <a:effectLst>
                   <a:outerShdw blurRad="63500" dist="38099" dir="2700000" algn="ctr" rotWithShape="0">
                     <a:schemeClr val="bg2">
@@ -447,7 +447,7 @@
               </a14:hiddenEffects>
             </a:ext>
             <a:ext uri="{FAA26D3D-D897-4be2-8F04-BA451C77F1D7}">
-              <ma14:placeholderFlag xmlns="" xmlns:ma14="http://schemas.microsoft.com/office/mac/drawingml/2011/main" val="1"/>
+              <ma14:placeholderFlag xmlns:ma14="http://schemas.microsoft.com/office/mac/drawingml/2011/main" xmlns="" val="1"/>
             </a:ext>
           </a:extLst>
         </p:spPr>
@@ -520,14 +520,14 @@
           <a:effectLst/>
           <a:extLst>
             <a:ext uri="{909E8E84-426E-40dd-AFC4-6F175D3DCCD1}">
-              <a14:hiddenFill xmlns="" xmlns:a14="http://schemas.microsoft.com/office/drawing/2010/main">
+              <a14:hiddenFill xmlns:a14="http://schemas.microsoft.com/office/drawing/2010/main" xmlns="">
                 <a:solidFill>
                   <a:schemeClr val="accent1"/>
                 </a:solidFill>
               </a14:hiddenFill>
             </a:ext>
             <a:ext uri="{91240B29-F687-4f45-9708-019B960494DF}">
-              <a14:hiddenLine xmlns="" xmlns:a14="http://schemas.microsoft.com/office/drawing/2010/main" w="9525">
+              <a14:hiddenLine xmlns:a14="http://schemas.microsoft.com/office/drawing/2010/main" xmlns="" w="9525">
                 <a:solidFill>
                   <a:schemeClr val="tx1"/>
                 </a:solidFill>
@@ -537,7 +537,7 @@
               </a14:hiddenLine>
             </a:ext>
             <a:ext uri="{AF507438-7753-43e0-B8FC-AC1667EBCBE1}">
-              <a14:hiddenEffects xmlns="" xmlns:a14="http://schemas.microsoft.com/office/drawing/2010/main">
+              <a14:hiddenEffects xmlns:a14="http://schemas.microsoft.com/office/drawing/2010/main" xmlns="">
                 <a:effectLst>
                   <a:outerShdw blurRad="63500" dist="38099" dir="2700000" algn="ctr" rotWithShape="0">
                     <a:schemeClr val="bg2">
@@ -548,7 +548,7 @@
               </a14:hiddenEffects>
             </a:ext>
             <a:ext uri="{FAA26D3D-D897-4be2-8F04-BA451C77F1D7}">
-              <ma14:placeholderFlag xmlns="" xmlns:ma14="http://schemas.microsoft.com/office/mac/drawingml/2011/main" val="1"/>
+              <ma14:placeholderFlag xmlns:ma14="http://schemas.microsoft.com/office/mac/drawingml/2011/main" xmlns="" val="1"/>
             </a:ext>
           </a:extLst>
         </p:spPr>
@@ -593,14 +593,14 @@
           <a:effectLst/>
           <a:extLst>
             <a:ext uri="{909E8E84-426E-40dd-AFC4-6F175D3DCCD1}">
-              <a14:hiddenFill xmlns="" xmlns:a14="http://schemas.microsoft.com/office/drawing/2010/main">
+              <a14:hiddenFill xmlns:a14="http://schemas.microsoft.com/office/drawing/2010/main" xmlns="">
                 <a:solidFill>
                   <a:schemeClr val="accent1"/>
                 </a:solidFill>
               </a14:hiddenFill>
             </a:ext>
             <a:ext uri="{91240B29-F687-4f45-9708-019B960494DF}">
-              <a14:hiddenLine xmlns="" xmlns:a14="http://schemas.microsoft.com/office/drawing/2010/main" w="9525">
+              <a14:hiddenLine xmlns:a14="http://schemas.microsoft.com/office/drawing/2010/main" xmlns="" w="9525">
                 <a:solidFill>
                   <a:schemeClr val="tx1"/>
                 </a:solidFill>
@@ -610,7 +610,7 @@
               </a14:hiddenLine>
             </a:ext>
             <a:ext uri="{AF507438-7753-43e0-B8FC-AC1667EBCBE1}">
-              <a14:hiddenEffects xmlns="" xmlns:a14="http://schemas.microsoft.com/office/drawing/2010/main">
+              <a14:hiddenEffects xmlns:a14="http://schemas.microsoft.com/office/drawing/2010/main" xmlns="">
                 <a:effectLst>
                   <a:outerShdw blurRad="63500" dist="38099" dir="2700000" algn="ctr" rotWithShape="0">
                     <a:schemeClr val="bg2">
@@ -621,7 +621,7 @@
               </a14:hiddenEffects>
             </a:ext>
             <a:ext uri="{FAA26D3D-D897-4be2-8F04-BA451C77F1D7}">
-              <ma14:placeholderFlag xmlns="" xmlns:ma14="http://schemas.microsoft.com/office/mac/drawingml/2011/main" val="1"/>
+              <ma14:placeholderFlag xmlns:ma14="http://schemas.microsoft.com/office/mac/drawingml/2011/main" xmlns="" val="1"/>
             </a:ext>
           </a:extLst>
         </p:spPr>
@@ -836,7 +836,7 @@
           <a:ln/>
           <a:extLst>
             <a:ext uri="{FAA26D3D-D897-4be2-8F04-BA451C77F1D7}">
-              <ma14:placeholderFlag xmlns="" xmlns:ma14="http://schemas.microsoft.com/office/mac/drawingml/2011/main" val="1"/>
+              <ma14:placeholderFlag xmlns:ma14="http://schemas.microsoft.com/office/mac/drawingml/2011/main" xmlns="" val="1"/>
             </a:ext>
           </a:extLst>
         </p:spPr>
@@ -2580,14 +2580,14 @@
           <a:effectLst/>
           <a:extLst>
             <a:ext uri="{909E8E84-426E-40dd-AFC4-6F175D3DCCD1}">
-              <a14:hiddenFill xmlns="" xmlns:a14="http://schemas.microsoft.com/office/drawing/2010/main">
+              <a14:hiddenFill xmlns:a14="http://schemas.microsoft.com/office/drawing/2010/main" xmlns="">
                 <a:solidFill>
                   <a:schemeClr val="accent1"/>
                 </a:solidFill>
               </a14:hiddenFill>
             </a:ext>
             <a:ext uri="{91240B29-F687-4f45-9708-019B960494DF}">
-              <a14:hiddenLine xmlns="" xmlns:a14="http://schemas.microsoft.com/office/drawing/2010/main" w="9525">
+              <a14:hiddenLine xmlns:a14="http://schemas.microsoft.com/office/drawing/2010/main" xmlns="" w="9525">
                 <a:solidFill>
                   <a:schemeClr val="tx1"/>
                 </a:solidFill>
@@ -2597,7 +2597,7 @@
               </a14:hiddenLine>
             </a:ext>
             <a:ext uri="{AF507438-7753-43e0-B8FC-AC1667EBCBE1}">
-              <a14:hiddenEffects xmlns="" xmlns:a14="http://schemas.microsoft.com/office/drawing/2010/main">
+              <a14:hiddenEffects xmlns:a14="http://schemas.microsoft.com/office/drawing/2010/main" xmlns="">
                 <a:effectLst>
                   <a:outerShdw blurRad="63500" dist="38099" dir="2700000" algn="ctr" rotWithShape="0">
                     <a:schemeClr val="bg2">
@@ -2608,7 +2608,7 @@
               </a14:hiddenEffects>
             </a:ext>
             <a:ext uri="{FAA26D3D-D897-4be2-8F04-BA451C77F1D7}">
-              <ma14:placeholderFlag xmlns="" xmlns:ma14="http://schemas.microsoft.com/office/mac/drawingml/2011/main" val="1"/>
+              <ma14:placeholderFlag xmlns:ma14="http://schemas.microsoft.com/office/mac/drawingml/2011/main" xmlns="" val="1"/>
             </a:ext>
           </a:extLst>
         </p:spPr>
@@ -2653,14 +2653,14 @@
           <a:effectLst/>
           <a:extLst>
             <a:ext uri="{909E8E84-426E-40dd-AFC4-6F175D3DCCD1}">
-              <a14:hiddenFill xmlns="" xmlns:a14="http://schemas.microsoft.com/office/drawing/2010/main">
+              <a14:hiddenFill xmlns:a14="http://schemas.microsoft.com/office/drawing/2010/main" xmlns="">
                 <a:solidFill>
                   <a:schemeClr val="accent1"/>
                 </a:solidFill>
               </a14:hiddenFill>
             </a:ext>
             <a:ext uri="{91240B29-F687-4f45-9708-019B960494DF}">
-              <a14:hiddenLine xmlns="" xmlns:a14="http://schemas.microsoft.com/office/drawing/2010/main" w="9525">
+              <a14:hiddenLine xmlns:a14="http://schemas.microsoft.com/office/drawing/2010/main" xmlns="" w="9525">
                 <a:solidFill>
                   <a:schemeClr val="tx1"/>
                 </a:solidFill>
@@ -2670,7 +2670,7 @@
               </a14:hiddenLine>
             </a:ext>
             <a:ext uri="{AF507438-7753-43e0-B8FC-AC1667EBCBE1}">
-              <a14:hiddenEffects xmlns="" xmlns:a14="http://schemas.microsoft.com/office/drawing/2010/main">
+              <a14:hiddenEffects xmlns:a14="http://schemas.microsoft.com/office/drawing/2010/main" xmlns="">
                 <a:effectLst>
                   <a:outerShdw blurRad="63500" dist="38099" dir="2700000" algn="ctr" rotWithShape="0">
                     <a:schemeClr val="bg2">
@@ -2681,7 +2681,7 @@
               </a14:hiddenEffects>
             </a:ext>
             <a:ext uri="{FAA26D3D-D897-4be2-8F04-BA451C77F1D7}">
-              <ma14:placeholderFlag xmlns="" xmlns:ma14="http://schemas.microsoft.com/office/mac/drawingml/2011/main" val="1"/>
+              <ma14:placeholderFlag xmlns:ma14="http://schemas.microsoft.com/office/mac/drawingml/2011/main" xmlns="" val="1"/>
             </a:ext>
           </a:extLst>
         </p:spPr>
@@ -2761,7 +2761,7 @@
           <a:noFill/>
           <a:extLst>
             <a:ext uri="{909E8E84-426E-40dd-AFC4-6F175D3DCCD1}">
-              <a14:hiddenFill xmlns="" xmlns:a14="http://schemas.microsoft.com/office/drawing/2010/main">
+              <a14:hiddenFill xmlns:a14="http://schemas.microsoft.com/office/drawing/2010/main" xmlns="">
                 <a:solidFill>
                   <a:srgbClr val="FFFFFF"/>
                 </a:solidFill>
@@ -2793,14 +2793,14 @@
           <a:effectLst/>
           <a:extLst>
             <a:ext uri="{909E8E84-426E-40dd-AFC4-6F175D3DCCD1}">
-              <a14:hiddenFill xmlns="" xmlns:a14="http://schemas.microsoft.com/office/drawing/2010/main">
+              <a14:hiddenFill xmlns:a14="http://schemas.microsoft.com/office/drawing/2010/main" xmlns="">
                 <a:solidFill>
                   <a:schemeClr val="accent1"/>
                 </a:solidFill>
               </a14:hiddenFill>
             </a:ext>
             <a:ext uri="{91240B29-F687-4f45-9708-019B960494DF}">
-              <a14:hiddenLine xmlns="" xmlns:a14="http://schemas.microsoft.com/office/drawing/2010/main" w="9525">
+              <a14:hiddenLine xmlns:a14="http://schemas.microsoft.com/office/drawing/2010/main" xmlns="" w="9525">
                 <a:solidFill>
                   <a:schemeClr val="tx1"/>
                 </a:solidFill>
@@ -2810,7 +2810,7 @@
               </a14:hiddenLine>
             </a:ext>
             <a:ext uri="{AF507438-7753-43e0-B8FC-AC1667EBCBE1}">
-              <a14:hiddenEffects xmlns="" xmlns:a14="http://schemas.microsoft.com/office/drawing/2010/main">
+              <a14:hiddenEffects xmlns:a14="http://schemas.microsoft.com/office/drawing/2010/main" xmlns="">
                 <a:effectLst>
                   <a:outerShdw blurRad="63500" dist="38099" dir="2700000" algn="ctr" rotWithShape="0">
                     <a:schemeClr val="bg2">
@@ -2879,7 +2879,7 @@
           <a:noFill/>
           <a:extLst>
             <a:ext uri="{909E8E84-426E-40dd-AFC4-6F175D3DCCD1}">
-              <a14:hiddenFill xmlns="" xmlns:a14="http://schemas.microsoft.com/office/drawing/2010/main">
+              <a14:hiddenFill xmlns:a14="http://schemas.microsoft.com/office/drawing/2010/main" xmlns="">
                 <a:solidFill>
                   <a:srgbClr val="FFFFFF"/>
                 </a:solidFill>
@@ -2916,12 +2916,12 @@
           <a:effectLst/>
           <a:extLst>
             <a:ext uri="{909E8E84-426E-40dd-AFC4-6F175D3DCCD1}">
-              <a14:hiddenFill xmlns="" xmlns:a14="http://schemas.microsoft.com/office/drawing/2010/main">
+              <a14:hiddenFill xmlns:a14="http://schemas.microsoft.com/office/drawing/2010/main" xmlns="">
                 <a:noFill/>
               </a14:hiddenFill>
             </a:ext>
             <a:ext uri="{AF507438-7753-43e0-B8FC-AC1667EBCBE1}">
-              <a14:hiddenEffects xmlns="" xmlns:a14="http://schemas.microsoft.com/office/drawing/2010/main">
+              <a14:hiddenEffects xmlns:a14="http://schemas.microsoft.com/office/drawing/2010/main" xmlns="">
                 <a:effectLst>
                   <a:outerShdw blurRad="63500" dist="38099" dir="2700000" algn="ctr" rotWithShape="0">
                     <a:schemeClr val="bg2">
@@ -2964,14 +2964,14 @@
           <a:effectLst/>
           <a:extLst>
             <a:ext uri="{909E8E84-426E-40dd-AFC4-6F175D3DCCD1}">
-              <a14:hiddenFill xmlns="" xmlns:a14="http://schemas.microsoft.com/office/drawing/2010/main">
+              <a14:hiddenFill xmlns:a14="http://schemas.microsoft.com/office/drawing/2010/main" xmlns="">
                 <a:solidFill>
                   <a:schemeClr val="accent1"/>
                 </a:solidFill>
               </a14:hiddenFill>
             </a:ext>
             <a:ext uri="{91240B29-F687-4f45-9708-019B960494DF}">
-              <a14:hiddenLine xmlns="" xmlns:a14="http://schemas.microsoft.com/office/drawing/2010/main" w="9525">
+              <a14:hiddenLine xmlns:a14="http://schemas.microsoft.com/office/drawing/2010/main" xmlns="" w="9525">
                 <a:solidFill>
                   <a:schemeClr val="tx1"/>
                 </a:solidFill>
@@ -2981,7 +2981,7 @@
               </a14:hiddenLine>
             </a:ext>
             <a:ext uri="{AF507438-7753-43e0-B8FC-AC1667EBCBE1}">
-              <a14:hiddenEffects xmlns="" xmlns:a14="http://schemas.microsoft.com/office/drawing/2010/main">
+              <a14:hiddenEffects xmlns:a14="http://schemas.microsoft.com/office/drawing/2010/main" xmlns="">
                 <a:effectLst>
                   <a:outerShdw blurRad="63500" dist="38099" dir="2700000" algn="ctr" rotWithShape="0">
                     <a:schemeClr val="bg2">
@@ -3048,14 +3048,14 @@
           <a:effectLst/>
           <a:extLst>
             <a:ext uri="{909E8E84-426E-40dd-AFC4-6F175D3DCCD1}">
-              <a14:hiddenFill xmlns="" xmlns:a14="http://schemas.microsoft.com/office/drawing/2010/main">
+              <a14:hiddenFill xmlns:a14="http://schemas.microsoft.com/office/drawing/2010/main" xmlns="">
                 <a:solidFill>
                   <a:schemeClr val="accent1"/>
                 </a:solidFill>
               </a14:hiddenFill>
             </a:ext>
             <a:ext uri="{91240B29-F687-4f45-9708-019B960494DF}">
-              <a14:hiddenLine xmlns="" xmlns:a14="http://schemas.microsoft.com/office/drawing/2010/main" w="9525">
+              <a14:hiddenLine xmlns:a14="http://schemas.microsoft.com/office/drawing/2010/main" xmlns="" w="9525">
                 <a:solidFill>
                   <a:schemeClr val="tx1"/>
                 </a:solidFill>
@@ -3065,7 +3065,7 @@
               </a14:hiddenLine>
             </a:ext>
             <a:ext uri="{AF507438-7753-43e0-B8FC-AC1667EBCBE1}">
-              <a14:hiddenEffects xmlns="" xmlns:a14="http://schemas.microsoft.com/office/drawing/2010/main">
+              <a14:hiddenEffects xmlns:a14="http://schemas.microsoft.com/office/drawing/2010/main" xmlns="">
                 <a:effectLst>
                   <a:outerShdw blurRad="63500" dist="38099" dir="2700000" algn="ctr" rotWithShape="0">
                     <a:schemeClr val="bg2">
@@ -3607,7 +3607,7 @@
           <a:noFill/>
           <a:extLst>
             <a:ext uri="{909E8E84-426E-40dd-AFC4-6F175D3DCCD1}">
-              <a14:hiddenFill xmlns="" xmlns:a14="http://schemas.microsoft.com/office/drawing/2010/main">
+              <a14:hiddenFill xmlns:a14="http://schemas.microsoft.com/office/drawing/2010/main" xmlns="">
                 <a:solidFill>
                   <a:srgbClr val="FFFFFF"/>
                 </a:solidFill>
@@ -3698,14 +3698,14 @@
           <a:effectLst/>
           <a:extLst>
             <a:ext uri="{909E8E84-426E-40dd-AFC4-6F175D3DCCD1}">
-              <a14:hiddenFill xmlns="" xmlns:a14="http://schemas.microsoft.com/office/drawing/2010/main">
+              <a14:hiddenFill xmlns:a14="http://schemas.microsoft.com/office/drawing/2010/main" xmlns="">
                 <a:solidFill>
                   <a:schemeClr val="accent1"/>
                 </a:solidFill>
               </a14:hiddenFill>
             </a:ext>
             <a:ext uri="{91240B29-F687-4f45-9708-019B960494DF}">
-              <a14:hiddenLine xmlns="" xmlns:a14="http://schemas.microsoft.com/office/drawing/2010/main" w="9525">
+              <a14:hiddenLine xmlns:a14="http://schemas.microsoft.com/office/drawing/2010/main" xmlns="" w="9525">
                 <a:solidFill>
                   <a:schemeClr val="tx1"/>
                 </a:solidFill>
@@ -3715,7 +3715,7 @@
               </a14:hiddenLine>
             </a:ext>
             <a:ext uri="{AF507438-7753-43e0-B8FC-AC1667EBCBE1}">
-              <a14:hiddenEffects xmlns="" xmlns:a14="http://schemas.microsoft.com/office/drawing/2010/main">
+              <a14:hiddenEffects xmlns:a14="http://schemas.microsoft.com/office/drawing/2010/main" xmlns="">
                 <a:effectLst>
                   <a:outerShdw blurRad="63500" dist="38099" dir="2700000" algn="ctr" rotWithShape="0">
                     <a:schemeClr val="bg2">
@@ -3770,7 +3770,7 @@
           <a:effectLst/>
           <a:extLst>
             <a:ext uri="{AF507438-7753-43e0-B8FC-AC1667EBCBE1}">
-              <a14:hiddenEffects xmlns="" xmlns:a14="http://schemas.microsoft.com/office/drawing/2010/main">
+              <a14:hiddenEffects xmlns:a14="http://schemas.microsoft.com/office/drawing/2010/main" xmlns="">
                 <a:effectLst>
                   <a:outerShdw blurRad="63500" dist="38099" dir="2700000" algn="ctr" rotWithShape="0">
                     <a:schemeClr val="bg2">
@@ -3820,7 +3820,7 @@
           <a:effectLst/>
           <a:extLst>
             <a:ext uri="{AF507438-7753-43e0-B8FC-AC1667EBCBE1}">
-              <a14:hiddenEffects xmlns="" xmlns:a14="http://schemas.microsoft.com/office/drawing/2010/main">
+              <a14:hiddenEffects xmlns:a14="http://schemas.microsoft.com/office/drawing/2010/main" xmlns="">
                 <a:effectLst>
                   <a:outerShdw blurRad="63500" dist="38099" dir="2700000" algn="ctr" rotWithShape="0">
                     <a:schemeClr val="bg2">
@@ -3863,14 +3863,14 @@
           <a:effectLst/>
           <a:extLst>
             <a:ext uri="{909E8E84-426E-40dd-AFC4-6F175D3DCCD1}">
-              <a14:hiddenFill xmlns="" xmlns:a14="http://schemas.microsoft.com/office/drawing/2010/main">
+              <a14:hiddenFill xmlns:a14="http://schemas.microsoft.com/office/drawing/2010/main" xmlns="">
                 <a:solidFill>
                   <a:schemeClr val="accent1"/>
                 </a:solidFill>
               </a14:hiddenFill>
             </a:ext>
             <a:ext uri="{91240B29-F687-4f45-9708-019B960494DF}">
-              <a14:hiddenLine xmlns="" xmlns:a14="http://schemas.microsoft.com/office/drawing/2010/main" w="9525">
+              <a14:hiddenLine xmlns:a14="http://schemas.microsoft.com/office/drawing/2010/main" xmlns="" w="9525">
                 <a:solidFill>
                   <a:schemeClr val="tx1"/>
                 </a:solidFill>
@@ -3880,7 +3880,7 @@
               </a14:hiddenLine>
             </a:ext>
             <a:ext uri="{AF507438-7753-43e0-B8FC-AC1667EBCBE1}">
-              <a14:hiddenEffects xmlns="" xmlns:a14="http://schemas.microsoft.com/office/drawing/2010/main">
+              <a14:hiddenEffects xmlns:a14="http://schemas.microsoft.com/office/drawing/2010/main" xmlns="">
                 <a:effectLst>
                   <a:outerShdw blurRad="63500" dist="38099" dir="2700000" algn="ctr" rotWithShape="0">
                     <a:schemeClr val="bg2">
@@ -4175,14 +4175,14 @@
           <a:effectLst/>
           <a:extLst>
             <a:ext uri="{909E8E84-426E-40dd-AFC4-6F175D3DCCD1}">
-              <a14:hiddenFill xmlns="" xmlns:a14="http://schemas.microsoft.com/office/drawing/2010/main">
+              <a14:hiddenFill xmlns:a14="http://schemas.microsoft.com/office/drawing/2010/main" xmlns="">
                 <a:solidFill>
                   <a:schemeClr val="accent1"/>
                 </a:solidFill>
               </a14:hiddenFill>
             </a:ext>
             <a:ext uri="{91240B29-F687-4f45-9708-019B960494DF}">
-              <a14:hiddenLine xmlns="" xmlns:a14="http://schemas.microsoft.com/office/drawing/2010/main" w="9525">
+              <a14:hiddenLine xmlns:a14="http://schemas.microsoft.com/office/drawing/2010/main" xmlns="" w="9525">
                 <a:solidFill>
                   <a:schemeClr val="tx1"/>
                 </a:solidFill>
@@ -4192,7 +4192,7 @@
               </a14:hiddenLine>
             </a:ext>
             <a:ext uri="{AF507438-7753-43e0-B8FC-AC1667EBCBE1}">
-              <a14:hiddenEffects xmlns="" xmlns:a14="http://schemas.microsoft.com/office/drawing/2010/main">
+              <a14:hiddenEffects xmlns:a14="http://schemas.microsoft.com/office/drawing/2010/main" xmlns="">
                 <a:effectLst>
                   <a:outerShdw blurRad="63500" dist="38099" dir="2700000" algn="ctr" rotWithShape="0">
                     <a:schemeClr val="bg2">
@@ -4203,7 +4203,7 @@
               </a14:hiddenEffects>
             </a:ext>
             <a:ext uri="{FAA26D3D-D897-4be2-8F04-BA451C77F1D7}">
-              <ma14:placeholderFlag xmlns="" xmlns:ma14="http://schemas.microsoft.com/office/mac/drawingml/2011/main" val="1"/>
+              <ma14:placeholderFlag xmlns:ma14="http://schemas.microsoft.com/office/mac/drawingml/2011/main" xmlns="" val="1"/>
             </a:ext>
           </a:extLst>
         </p:spPr>
@@ -4545,14 +4545,14 @@
           <a:effectLst/>
           <a:extLst>
             <a:ext uri="{909E8E84-426E-40dd-AFC4-6F175D3DCCD1}">
-              <a14:hiddenFill xmlns="" xmlns:a14="http://schemas.microsoft.com/office/drawing/2010/main">
+              <a14:hiddenFill xmlns:a14="http://schemas.microsoft.com/office/drawing/2010/main" xmlns="">
                 <a:solidFill>
                   <a:schemeClr val="accent1"/>
                 </a:solidFill>
               </a14:hiddenFill>
             </a:ext>
             <a:ext uri="{91240B29-F687-4f45-9708-019B960494DF}">
-              <a14:hiddenLine xmlns="" xmlns:a14="http://schemas.microsoft.com/office/drawing/2010/main" w="9525">
+              <a14:hiddenLine xmlns:a14="http://schemas.microsoft.com/office/drawing/2010/main" xmlns="" w="9525">
                 <a:solidFill>
                   <a:schemeClr val="tx1"/>
                 </a:solidFill>
@@ -4562,7 +4562,7 @@
               </a14:hiddenLine>
             </a:ext>
             <a:ext uri="{AF507438-7753-43e0-B8FC-AC1667EBCBE1}">
-              <a14:hiddenEffects xmlns="" xmlns:a14="http://schemas.microsoft.com/office/drawing/2010/main">
+              <a14:hiddenEffects xmlns:a14="http://schemas.microsoft.com/office/drawing/2010/main" xmlns="">
                 <a:effectLst>
                   <a:outerShdw blurRad="63500" dist="38099" dir="2700000" algn="ctr" rotWithShape="0">
                     <a:schemeClr val="bg2">
@@ -4573,7 +4573,7 @@
               </a14:hiddenEffects>
             </a:ext>
             <a:ext uri="{FAA26D3D-D897-4be2-8F04-BA451C77F1D7}">
-              <ma14:placeholderFlag xmlns="" xmlns:ma14="http://schemas.microsoft.com/office/mac/drawingml/2011/main" val="1"/>
+              <ma14:placeholderFlag xmlns:ma14="http://schemas.microsoft.com/office/mac/drawingml/2011/main" xmlns="" val="1"/>
             </a:ext>
           </a:extLst>
         </p:spPr>
@@ -5544,7 +5544,7 @@
           <a:effectLst/>
           <a:extLst>
             <a:ext uri="{AF507438-7753-43e0-B8FC-AC1667EBCBE1}">
-              <a14:hiddenEffects xmlns="" xmlns:a14="http://schemas.microsoft.com/office/drawing/2010/main">
+              <a14:hiddenEffects xmlns:a14="http://schemas.microsoft.com/office/drawing/2010/main" xmlns="">
                 <a:effectLst>
                   <a:outerShdw blurRad="63500" dist="35921" dir="2700000" algn="ctr" rotWithShape="0">
                     <a:schemeClr val="bg2"/>
@@ -5644,7 +5644,7 @@
           <a:effectLst/>
           <a:extLst>
             <a:ext uri="{AF507438-7753-43e0-B8FC-AC1667EBCBE1}">
-              <a14:hiddenEffects xmlns="" xmlns:a14="http://schemas.microsoft.com/office/drawing/2010/main">
+              <a14:hiddenEffects xmlns:a14="http://schemas.microsoft.com/office/drawing/2010/main" xmlns="">
                 <a:effectLst>
                   <a:outerShdw blurRad="63500" dist="35921" dir="2700000" algn="ctr" rotWithShape="0">
                     <a:schemeClr val="bg2"/>
@@ -5722,7 +5722,7 @@
           <a:effectLst/>
           <a:extLst>
             <a:ext uri="{AF507438-7753-43e0-B8FC-AC1667EBCBE1}">
-              <a14:hiddenEffects xmlns="" xmlns:a14="http://schemas.microsoft.com/office/drawing/2010/main">
+              <a14:hiddenEffects xmlns:a14="http://schemas.microsoft.com/office/drawing/2010/main" xmlns="">
                 <a:effectLst>
                   <a:outerShdw blurRad="63500" dist="35921" dir="2700000" algn="ctr" rotWithShape="0">
                     <a:schemeClr val="bg2"/>
@@ -5800,7 +5800,7 @@
           <a:effectLst/>
           <a:extLst>
             <a:ext uri="{AF507438-7753-43e0-B8FC-AC1667EBCBE1}">
-              <a14:hiddenEffects xmlns="" xmlns:a14="http://schemas.microsoft.com/office/drawing/2010/main">
+              <a14:hiddenEffects xmlns:a14="http://schemas.microsoft.com/office/drawing/2010/main" xmlns="">
                 <a:effectLst>
                   <a:outerShdw blurRad="63500" dist="35921" dir="2700000" algn="ctr" rotWithShape="0">
                     <a:schemeClr val="bg2"/>
@@ -5878,7 +5878,7 @@
           <a:effectLst/>
           <a:extLst>
             <a:ext uri="{AF507438-7753-43e0-B8FC-AC1667EBCBE1}">
-              <a14:hiddenEffects xmlns="" xmlns:a14="http://schemas.microsoft.com/office/drawing/2010/main">
+              <a14:hiddenEffects xmlns:a14="http://schemas.microsoft.com/office/drawing/2010/main" xmlns="">
                 <a:effectLst>
                   <a:outerShdw blurRad="63500" dist="35921" dir="2700000" algn="ctr" rotWithShape="0">
                     <a:schemeClr val="bg2"/>
@@ -5956,7 +5956,7 @@
           <a:effectLst/>
           <a:extLst>
             <a:ext uri="{AF507438-7753-43e0-B8FC-AC1667EBCBE1}">
-              <a14:hiddenEffects xmlns="" xmlns:a14="http://schemas.microsoft.com/office/drawing/2010/main">
+              <a14:hiddenEffects xmlns:a14="http://schemas.microsoft.com/office/drawing/2010/main" xmlns="">
                 <a:effectLst>
                   <a:outerShdw blurRad="63500" dist="35921" dir="2700000" algn="ctr" rotWithShape="0">
                     <a:schemeClr val="bg2"/>
@@ -6034,7 +6034,7 @@
           <a:effectLst/>
           <a:extLst>
             <a:ext uri="{AF507438-7753-43e0-B8FC-AC1667EBCBE1}">
-              <a14:hiddenEffects xmlns="" xmlns:a14="http://schemas.microsoft.com/office/drawing/2010/main">
+              <a14:hiddenEffects xmlns:a14="http://schemas.microsoft.com/office/drawing/2010/main" xmlns="">
                 <a:effectLst>
                   <a:outerShdw blurRad="63500" dist="35921" dir="2700000" algn="ctr" rotWithShape="0">
                     <a:schemeClr val="bg2"/>
@@ -6103,7 +6103,7 @@
           <a:effectLst/>
           <a:extLst>
             <a:ext uri="{AF507438-7753-43e0-B8FC-AC1667EBCBE1}">
-              <a14:hiddenEffects xmlns="" xmlns:a14="http://schemas.microsoft.com/office/drawing/2010/main">
+              <a14:hiddenEffects xmlns:a14="http://schemas.microsoft.com/office/drawing/2010/main" xmlns="">
                 <a:effectLst>
                   <a:outerShdw blurRad="63500" dist="35921" dir="2700000" algn="ctr" rotWithShape="0">
                     <a:schemeClr val="bg2"/>
@@ -6451,7 +6451,7 @@
             <p:ph idx="1"/>
             <p:extLst>
               <p:ext uri="{D42A27DB-BD31-4B8C-83A1-F6EECF244321}">
-                <p14:modId xmlns:p14="http://schemas.microsoft.com/office/powerpoint/2010/main" val="32038058"/>
+                <p14:modId xmlns:p14="http://schemas.microsoft.com/office/powerpoint/2010/main" val="2273483003"/>
               </p:ext>
             </p:extLst>
           </p:nvPr>
@@ -6479,10 +6479,18 @@
                     <a:p>
                       <a:pPr algn="ctr"/>
                       <a:r>
-                        <a:rPr lang="en-US" dirty="0" smtClean="0"/>
+                        <a:rPr lang="en-US" dirty="0" smtClean="0">
+                          <a:solidFill>
+                            <a:schemeClr val="tx1"/>
+                          </a:solidFill>
+                        </a:rPr>
                         <a:t>Time</a:t>
                       </a:r>
-                      <a:endParaRPr lang="en-US" dirty="0"/>
+                      <a:endParaRPr lang="en-US" dirty="0">
+                        <a:solidFill>
+                          <a:schemeClr val="tx1"/>
+                        </a:solidFill>
+                      </a:endParaRPr>
                     </a:p>
                   </a:txBody>
                   <a:tcPr/>
@@ -6494,10 +6502,18 @@
                     <a:p>
                       <a:pPr algn="ctr"/>
                       <a:r>
-                        <a:rPr lang="en-US" dirty="0" smtClean="0"/>
+                        <a:rPr lang="en-US" dirty="0" smtClean="0">
+                          <a:solidFill>
+                            <a:schemeClr val="tx1"/>
+                          </a:solidFill>
+                        </a:rPr>
                         <a:t>Sensor Name</a:t>
                       </a:r>
-                      <a:endParaRPr lang="en-US" dirty="0"/>
+                      <a:endParaRPr lang="en-US" dirty="0">
+                        <a:solidFill>
+                          <a:schemeClr val="tx1"/>
+                        </a:solidFill>
+                      </a:endParaRPr>
                     </a:p>
                   </a:txBody>
                   <a:tcPr/>
@@ -6509,10 +6525,18 @@
                     <a:p>
                       <a:pPr algn="ctr"/>
                       <a:r>
-                        <a:rPr lang="en-US" dirty="0" smtClean="0"/>
+                        <a:rPr lang="en-US" dirty="0" smtClean="0">
+                          <a:solidFill>
+                            <a:schemeClr val="tx1"/>
+                          </a:solidFill>
+                        </a:rPr>
                         <a:t>Sensor Value</a:t>
                       </a:r>
-                      <a:endParaRPr lang="en-US" dirty="0"/>
+                      <a:endParaRPr lang="en-US" dirty="0">
+                        <a:solidFill>
+                          <a:schemeClr val="tx1"/>
+                        </a:solidFill>
+                      </a:endParaRPr>
                     </a:p>
                   </a:txBody>
                   <a:tcPr/>
@@ -7124,7 +7148,7 @@
           <p:nvPr>
             <p:extLst>
               <p:ext uri="{D42A27DB-BD31-4B8C-83A1-F6EECF244321}">
-                <p14:modId xmlns:p14="http://schemas.microsoft.com/office/powerpoint/2010/main" val="272534515"/>
+                <p14:modId xmlns:p14="http://schemas.microsoft.com/office/powerpoint/2010/main" val="3783864220"/>
               </p:ext>
             </p:extLst>
           </p:nvPr>
@@ -7152,10 +7176,18 @@
                     <a:p>
                       <a:pPr algn="ctr"/>
                       <a:r>
-                        <a:rPr lang="en-US" dirty="0" smtClean="0"/>
+                        <a:rPr lang="en-US" dirty="0" smtClean="0">
+                          <a:solidFill>
+                            <a:schemeClr val="tx1"/>
+                          </a:solidFill>
+                        </a:rPr>
                         <a:t>Time</a:t>
                       </a:r>
-                      <a:endParaRPr lang="en-US" dirty="0"/>
+                      <a:endParaRPr lang="en-US" dirty="0">
+                        <a:solidFill>
+                          <a:schemeClr val="tx1"/>
+                        </a:solidFill>
+                      </a:endParaRPr>
                     </a:p>
                   </a:txBody>
                   <a:tcPr/>
@@ -7167,10 +7199,18 @@
                     <a:p>
                       <a:pPr algn="ctr"/>
                       <a:r>
-                        <a:rPr lang="en-US" dirty="0" smtClean="0"/>
+                        <a:rPr lang="en-US" dirty="0" smtClean="0">
+                          <a:solidFill>
+                            <a:schemeClr val="tx1"/>
+                          </a:solidFill>
+                        </a:rPr>
                         <a:t>Sensor Name</a:t>
                       </a:r>
-                      <a:endParaRPr lang="en-US" dirty="0"/>
+                      <a:endParaRPr lang="en-US" dirty="0">
+                        <a:solidFill>
+                          <a:schemeClr val="tx1"/>
+                        </a:solidFill>
+                      </a:endParaRPr>
                     </a:p>
                   </a:txBody>
                   <a:tcPr/>
@@ -7182,10 +7222,18 @@
                     <a:p>
                       <a:pPr algn="ctr"/>
                       <a:r>
-                        <a:rPr lang="en-US" dirty="0" smtClean="0"/>
+                        <a:rPr lang="en-US" dirty="0" smtClean="0">
+                          <a:solidFill>
+                            <a:schemeClr val="tx1"/>
+                          </a:solidFill>
+                        </a:rPr>
                         <a:t>Sensor Value</a:t>
                       </a:r>
-                      <a:endParaRPr lang="en-US" dirty="0"/>
+                      <a:endParaRPr lang="en-US" dirty="0">
+                        <a:solidFill>
+                          <a:schemeClr val="tx1"/>
+                        </a:solidFill>
+                      </a:endParaRPr>
                     </a:p>
                   </a:txBody>
                   <a:tcPr/>
@@ -7812,14 +7860,14 @@
           <a:effectLst/>
           <a:extLst>
             <a:ext uri="{909E8E84-426E-40dd-AFC4-6F175D3DCCD1}">
-              <a14:hiddenFill xmlns="" xmlns:a14="http://schemas.microsoft.com/office/drawing/2010/main">
+              <a14:hiddenFill xmlns:a14="http://schemas.microsoft.com/office/drawing/2010/main" xmlns="">
                 <a:solidFill>
                   <a:schemeClr val="accent1"/>
                 </a:solidFill>
               </a14:hiddenFill>
             </a:ext>
             <a:ext uri="{91240B29-F687-4f45-9708-019B960494DF}">
-              <a14:hiddenLine xmlns="" xmlns:a14="http://schemas.microsoft.com/office/drawing/2010/main" w="9525">
+              <a14:hiddenLine xmlns:a14="http://schemas.microsoft.com/office/drawing/2010/main" xmlns="" w="9525">
                 <a:solidFill>
                   <a:schemeClr val="tx1"/>
                 </a:solidFill>
@@ -7829,7 +7877,7 @@
               </a14:hiddenLine>
             </a:ext>
             <a:ext uri="{AF507438-7753-43e0-B8FC-AC1667EBCBE1}">
-              <a14:hiddenEffects xmlns="" xmlns:a14="http://schemas.microsoft.com/office/drawing/2010/main">
+              <a14:hiddenEffects xmlns:a14="http://schemas.microsoft.com/office/drawing/2010/main" xmlns="">
                 <a:effectLst>
                   <a:outerShdw blurRad="63500" dist="38099" dir="2700000" algn="ctr" rotWithShape="0">
                     <a:schemeClr val="bg2">
@@ -7840,7 +7888,7 @@
               </a14:hiddenEffects>
             </a:ext>
             <a:ext uri="{FAA26D3D-D897-4be2-8F04-BA451C77F1D7}">
-              <ma14:placeholderFlag xmlns="" xmlns:ma14="http://schemas.microsoft.com/office/mac/drawingml/2011/main" val="1"/>
+              <ma14:placeholderFlag xmlns:ma14="http://schemas.microsoft.com/office/mac/drawingml/2011/main" xmlns="" val="1"/>
             </a:ext>
           </a:extLst>
         </p:spPr>
@@ -8142,550 +8190,6 @@
       </p:sp>
       <p:sp>
         <p:nvSpPr>
-          <p:cNvPr id="3" name="Content Placeholder 2"/>
-          <p:cNvSpPr>
-            <a:spLocks noGrp="1"/>
-          </p:cNvSpPr>
-          <p:nvPr>
-            <p:ph idx="1"/>
-          </p:nvPr>
-        </p:nvSpPr>
-        <p:spPr>
-          <a:xfrm>
-            <a:off x="457200" y="1371600"/>
-            <a:ext cx="8229600" cy="4525963"/>
-          </a:xfrm>
-        </p:spPr>
-        <p:txBody>
-          <a:bodyPr/>
-          <a:lstStyle/>
-          <a:p>
-            <a:pPr marL="0" indent="0">
-              <a:buNone/>
-            </a:pPr>
-            <a:r>
-              <a:rPr lang="en-US" sz="1600" b="1" dirty="0" smtClean="0">
-                <a:latin typeface="Courier"/>
-                <a:cs typeface="Courier"/>
-              </a:rPr>
-              <a:t>Data</a:t>
-            </a:r>
-            <a:r>
-              <a:rPr lang="en-US" sz="1600" dirty="0" smtClean="0">
-                <a:latin typeface="Courier"/>
-                <a:cs typeface="Courier"/>
-              </a:rPr>
-              <a:t> : D, w</a:t>
-            </a:r>
-          </a:p>
-          <a:p>
-            <a:pPr marL="0" indent="0">
-              <a:buNone/>
-            </a:pPr>
-            <a:r>
-              <a:rPr lang="en-US" sz="1600" b="1" dirty="0" smtClean="0">
-                <a:latin typeface="Courier"/>
-                <a:cs typeface="Courier"/>
-              </a:rPr>
-              <a:t>Result</a:t>
-            </a:r>
-            <a:r>
-              <a:rPr lang="en-US" sz="1600" dirty="0" smtClean="0">
-                <a:latin typeface="Courier"/>
-                <a:cs typeface="Courier"/>
-              </a:rPr>
-              <a:t> : All Detected Group in a Window</a:t>
-            </a:r>
-          </a:p>
-          <a:p>
-            <a:pPr marL="0" indent="0">
-              <a:buNone/>
-            </a:pPr>
-            <a:r>
-              <a:rPr lang="en-US" sz="1600" dirty="0" err="1" smtClean="0">
-                <a:latin typeface="Courier"/>
-                <a:cs typeface="Courier"/>
-              </a:rPr>
-              <a:t>grpAll</a:t>
-            </a:r>
-            <a:r>
-              <a:rPr lang="en-US" sz="1600" dirty="0" smtClean="0">
-                <a:latin typeface="Courier"/>
-                <a:cs typeface="Courier"/>
-              </a:rPr>
-              <a:t>, </a:t>
-            </a:r>
-            <a:r>
-              <a:rPr lang="en-US" sz="1600" dirty="0" err="1" smtClean="0">
-                <a:latin typeface="Courier"/>
-                <a:cs typeface="Courier"/>
-              </a:rPr>
-              <a:t>grpTemp</a:t>
-            </a:r>
-            <a:r>
-              <a:rPr lang="en-US" sz="1600" dirty="0" smtClean="0">
-                <a:latin typeface="Courier"/>
-                <a:cs typeface="Courier"/>
-              </a:rPr>
-              <a:t>, </a:t>
-            </a:r>
-            <a:r>
-              <a:rPr lang="en-US" sz="1600" dirty="0" err="1" smtClean="0">
-                <a:latin typeface="Courier"/>
-                <a:cs typeface="Courier"/>
-              </a:rPr>
-              <a:t>grpPrevious</a:t>
-            </a:r>
-            <a:r>
-              <a:rPr lang="en-US" sz="1600" dirty="0" smtClean="0">
-                <a:latin typeface="Courier"/>
-                <a:cs typeface="Courier"/>
-              </a:rPr>
-              <a:t>&lt;- NULL</a:t>
-            </a:r>
-          </a:p>
-          <a:p>
-            <a:pPr marL="0" indent="0">
-              <a:buNone/>
-            </a:pPr>
-            <a:r>
-              <a:rPr lang="en-US" sz="1600" dirty="0" err="1" smtClean="0">
-                <a:latin typeface="Courier"/>
-                <a:cs typeface="Courier"/>
-              </a:rPr>
-              <a:t>dataValue</a:t>
-            </a:r>
-            <a:r>
-              <a:rPr lang="en-US" sz="1600" dirty="0" smtClean="0">
-                <a:latin typeface="Courier"/>
-                <a:cs typeface="Courier"/>
-              </a:rPr>
-              <a:t>, </a:t>
-            </a:r>
-            <a:r>
-              <a:rPr lang="en-US" sz="1600" dirty="0" err="1" smtClean="0">
-                <a:latin typeface="Courier"/>
-                <a:cs typeface="Courier"/>
-              </a:rPr>
-              <a:t>dataValueNext</a:t>
-            </a:r>
-            <a:r>
-              <a:rPr lang="en-US" sz="1600" dirty="0" smtClean="0">
-                <a:latin typeface="Courier"/>
-                <a:cs typeface="Courier"/>
-              </a:rPr>
-              <a:t> &lt;- NULL</a:t>
-            </a:r>
-          </a:p>
-          <a:p>
-            <a:pPr marL="0" indent="0">
-              <a:buNone/>
-            </a:pPr>
-            <a:r>
-              <a:rPr lang="en-US" sz="1600" b="1" dirty="0">
-                <a:latin typeface="Courier"/>
-                <a:cs typeface="Courier"/>
-              </a:rPr>
-              <a:t>w</a:t>
-            </a:r>
-            <a:r>
-              <a:rPr lang="en-US" sz="1600" b="1" dirty="0" smtClean="0">
-                <a:latin typeface="Courier"/>
-                <a:cs typeface="Courier"/>
-              </a:rPr>
-              <a:t>hile</a:t>
-            </a:r>
-            <a:r>
-              <a:rPr lang="en-US" sz="1600" dirty="0" smtClean="0">
-                <a:latin typeface="Courier"/>
-                <a:cs typeface="Courier"/>
-              </a:rPr>
-              <a:t> (D in w) for all of D </a:t>
-            </a:r>
-            <a:r>
-              <a:rPr lang="en-US" sz="1600" b="1" dirty="0" smtClean="0">
-                <a:latin typeface="Courier"/>
-                <a:cs typeface="Courier"/>
-              </a:rPr>
-              <a:t>do</a:t>
-            </a:r>
-          </a:p>
-          <a:p>
-            <a:pPr marL="400050" lvl="1" indent="0">
-              <a:buNone/>
-            </a:pPr>
-            <a:r>
-              <a:rPr lang="en-US" sz="1400" dirty="0" err="1" smtClean="0">
-                <a:latin typeface="Courier"/>
-                <a:cs typeface="Courier"/>
-              </a:rPr>
-              <a:t>dataValue</a:t>
-            </a:r>
-            <a:r>
-              <a:rPr lang="en-US" sz="1400" dirty="0" smtClean="0">
-                <a:latin typeface="Courier"/>
-                <a:cs typeface="Courier"/>
-              </a:rPr>
-              <a:t> &lt;- </a:t>
-            </a:r>
-            <a:r>
-              <a:rPr lang="en-US" sz="1400" dirty="0" err="1" smtClean="0">
-                <a:latin typeface="Courier"/>
-                <a:cs typeface="Courier"/>
-              </a:rPr>
-              <a:t>D.current.day</a:t>
-            </a:r>
-            <a:endParaRPr lang="en-US" sz="1400" dirty="0" smtClean="0">
-              <a:latin typeface="Courier"/>
-              <a:cs typeface="Courier"/>
-            </a:endParaRPr>
-          </a:p>
-          <a:p>
-            <a:pPr marL="400050" lvl="1" indent="0">
-              <a:buNone/>
-            </a:pPr>
-            <a:r>
-              <a:rPr lang="en-US" sz="1400" dirty="0" err="1" smtClean="0">
-                <a:latin typeface="Courier"/>
-                <a:cs typeface="Courier"/>
-              </a:rPr>
-              <a:t>dataValueNext</a:t>
-            </a:r>
-            <a:r>
-              <a:rPr lang="en-US" sz="1400" dirty="0" smtClean="0">
-                <a:latin typeface="Courier"/>
-                <a:cs typeface="Courier"/>
-              </a:rPr>
-              <a:t> &lt;- </a:t>
-            </a:r>
-            <a:r>
-              <a:rPr lang="en-US" sz="1400" dirty="0" err="1" smtClean="0">
-                <a:latin typeface="Courier"/>
-                <a:cs typeface="Courier"/>
-              </a:rPr>
-              <a:t>D.next.day</a:t>
-            </a:r>
-            <a:endParaRPr lang="en-US" sz="1400" dirty="0" smtClean="0">
-              <a:latin typeface="Courier"/>
-              <a:cs typeface="Courier"/>
-            </a:endParaRPr>
-          </a:p>
-          <a:p>
-            <a:pPr marL="400050" lvl="1" indent="0">
-              <a:buNone/>
-            </a:pPr>
-            <a:r>
-              <a:rPr lang="en-US" sz="1400" dirty="0" err="1" smtClean="0">
-                <a:latin typeface="Courier"/>
-                <a:cs typeface="Courier"/>
-              </a:rPr>
-              <a:t>grpTemp</a:t>
-            </a:r>
-            <a:r>
-              <a:rPr lang="en-US" sz="1400" dirty="0" smtClean="0">
-                <a:latin typeface="Courier"/>
-                <a:cs typeface="Courier"/>
-              </a:rPr>
-              <a:t> &lt;- </a:t>
-            </a:r>
-            <a:r>
-              <a:rPr lang="en-US" sz="1400" i="1" dirty="0" err="1" smtClean="0">
-                <a:latin typeface="Courier"/>
-                <a:cs typeface="Courier"/>
-              </a:rPr>
-              <a:t>findingSimilarPatterns</a:t>
-            </a:r>
-            <a:r>
-              <a:rPr lang="en-US" sz="1400" dirty="0" smtClean="0">
-                <a:latin typeface="Courier"/>
-                <a:cs typeface="Courier"/>
-              </a:rPr>
-              <a:t>(</a:t>
-            </a:r>
-            <a:r>
-              <a:rPr lang="en-US" sz="1400" dirty="0" err="1" smtClean="0">
-                <a:latin typeface="Courier"/>
-                <a:cs typeface="Courier"/>
-              </a:rPr>
-              <a:t>dataValue</a:t>
-            </a:r>
-            <a:r>
-              <a:rPr lang="en-US" sz="1400" dirty="0" smtClean="0">
-                <a:latin typeface="Courier"/>
-                <a:cs typeface="Courier"/>
-              </a:rPr>
-              <a:t>, </a:t>
-            </a:r>
-            <a:r>
-              <a:rPr lang="en-US" sz="1400" dirty="0" err="1" smtClean="0">
-                <a:latin typeface="Courier"/>
-                <a:cs typeface="Courier"/>
-              </a:rPr>
-              <a:t>dataValueNext</a:t>
-            </a:r>
-            <a:r>
-              <a:rPr lang="en-US" sz="1400" dirty="0" smtClean="0">
-                <a:latin typeface="Courier"/>
-                <a:cs typeface="Courier"/>
-              </a:rPr>
-              <a:t>)</a:t>
-            </a:r>
-          </a:p>
-          <a:p>
-            <a:pPr marL="400050" lvl="1" indent="0">
-              <a:buNone/>
-            </a:pPr>
-            <a:endParaRPr lang="en-US" sz="1400" dirty="0" smtClean="0">
-              <a:latin typeface="Courier"/>
-              <a:cs typeface="Courier"/>
-            </a:endParaRPr>
-          </a:p>
-          <a:p>
-            <a:pPr marL="400050" lvl="1" indent="0">
-              <a:buNone/>
-            </a:pPr>
-            <a:r>
-              <a:rPr lang="en-US" sz="1400" dirty="0">
-                <a:latin typeface="Courier"/>
-                <a:cs typeface="Courier"/>
-              </a:rPr>
-              <a:t>i</a:t>
-            </a:r>
-            <a:r>
-              <a:rPr lang="en-US" sz="1400" dirty="0" smtClean="0">
-                <a:latin typeface="Courier"/>
-                <a:cs typeface="Courier"/>
-              </a:rPr>
-              <a:t>f </a:t>
-            </a:r>
-            <a:r>
-              <a:rPr lang="en-US" sz="1400" i="1" dirty="0" smtClean="0">
-                <a:latin typeface="Courier"/>
-                <a:cs typeface="Courier"/>
-              </a:rPr>
-              <a:t>(</a:t>
-            </a:r>
-            <a:r>
-              <a:rPr lang="en-US" sz="1400" dirty="0" err="1" smtClean="0">
-                <a:latin typeface="Courier"/>
-                <a:cs typeface="Courier"/>
-              </a:rPr>
-              <a:t>grpTemp</a:t>
-            </a:r>
-            <a:r>
-              <a:rPr lang="en-US" sz="1400" i="1" dirty="0" smtClean="0">
-                <a:latin typeface="Courier"/>
-                <a:cs typeface="Courier"/>
-              </a:rPr>
-              <a:t> in </a:t>
-            </a:r>
-            <a:r>
-              <a:rPr lang="en-US" sz="1400" dirty="0" err="1" smtClean="0">
-                <a:latin typeface="Courier"/>
-                <a:cs typeface="Courier"/>
-              </a:rPr>
-              <a:t>grpPrevious</a:t>
-            </a:r>
-            <a:r>
-              <a:rPr lang="en-US" sz="1400" i="1" dirty="0" smtClean="0">
-                <a:latin typeface="Courier"/>
-                <a:cs typeface="Courier"/>
-              </a:rPr>
-              <a:t>)</a:t>
-            </a:r>
-            <a:r>
-              <a:rPr lang="en-US" sz="1400" dirty="0" smtClean="0">
-                <a:latin typeface="Courier"/>
-                <a:cs typeface="Courier"/>
-              </a:rPr>
-              <a:t>then</a:t>
-            </a:r>
-          </a:p>
-          <a:p>
-            <a:pPr marL="400050" lvl="1" indent="0">
-              <a:buNone/>
-            </a:pPr>
-            <a:r>
-              <a:rPr lang="en-US" sz="1400" dirty="0" smtClean="0">
-                <a:latin typeface="Courier"/>
-                <a:cs typeface="Courier"/>
-              </a:rPr>
-              <a:t>	</a:t>
-            </a:r>
-            <a:r>
-              <a:rPr lang="en-US" sz="1400" dirty="0" err="1" smtClean="0">
-                <a:latin typeface="Courier"/>
-                <a:cs typeface="Courier"/>
-              </a:rPr>
-              <a:t>grpNew</a:t>
-            </a:r>
-            <a:r>
-              <a:rPr lang="en-US" sz="1400" dirty="0" smtClean="0">
-                <a:latin typeface="Courier"/>
-                <a:cs typeface="Courier"/>
-              </a:rPr>
-              <a:t> &lt;- </a:t>
-            </a:r>
-            <a:r>
-              <a:rPr lang="en-US" sz="1400" i="1" dirty="0" smtClean="0">
-                <a:latin typeface="Courier"/>
-                <a:cs typeface="Courier"/>
-              </a:rPr>
-              <a:t>merge</a:t>
-            </a:r>
-            <a:r>
-              <a:rPr lang="en-US" sz="1400" dirty="0" smtClean="0">
-                <a:latin typeface="Courier"/>
-                <a:cs typeface="Courier"/>
-              </a:rPr>
-              <a:t>(</a:t>
-            </a:r>
-            <a:r>
-              <a:rPr lang="en-US" sz="1400" dirty="0" err="1">
-                <a:latin typeface="Courier"/>
-                <a:cs typeface="Courier"/>
-              </a:rPr>
-              <a:t>grpPrevious</a:t>
-            </a:r>
-            <a:r>
-              <a:rPr lang="en-US" sz="1400" dirty="0" smtClean="0">
-                <a:latin typeface="Courier"/>
-                <a:cs typeface="Courier"/>
-              </a:rPr>
-              <a:t>, </a:t>
-            </a:r>
-            <a:r>
-              <a:rPr lang="en-US" sz="1400" dirty="0" err="1">
-                <a:latin typeface="Courier"/>
-                <a:cs typeface="Courier"/>
-              </a:rPr>
-              <a:t>grpTemp</a:t>
-            </a:r>
-            <a:r>
-              <a:rPr lang="en-US" sz="1400" dirty="0" smtClean="0">
-                <a:latin typeface="Courier"/>
-                <a:cs typeface="Courier"/>
-              </a:rPr>
-              <a:t>)</a:t>
-            </a:r>
-          </a:p>
-          <a:p>
-            <a:pPr marL="400050" lvl="1" indent="0">
-              <a:buNone/>
-            </a:pPr>
-            <a:r>
-              <a:rPr lang="en-US" sz="1400" dirty="0" smtClean="0">
-                <a:latin typeface="Courier"/>
-                <a:cs typeface="Courier"/>
-              </a:rPr>
-              <a:t>	</a:t>
-            </a:r>
-            <a:r>
-              <a:rPr lang="en-US" sz="1400" dirty="0" err="1" smtClean="0">
-                <a:latin typeface="Courier"/>
-                <a:cs typeface="Courier"/>
-              </a:rPr>
-              <a:t>grpAll</a:t>
-            </a:r>
-            <a:r>
-              <a:rPr lang="en-US" sz="1400" i="1" dirty="0" smtClean="0">
-                <a:latin typeface="Courier"/>
-                <a:cs typeface="Courier"/>
-              </a:rPr>
-              <a:t> &lt;- add</a:t>
-            </a:r>
-            <a:r>
-              <a:rPr lang="en-US" sz="1400" dirty="0" smtClean="0">
-                <a:latin typeface="Courier"/>
-                <a:cs typeface="Courier"/>
-              </a:rPr>
-              <a:t>(</a:t>
-            </a:r>
-            <a:r>
-              <a:rPr lang="en-US" sz="1400" dirty="0" err="1" smtClean="0">
-                <a:latin typeface="Courier"/>
-                <a:cs typeface="Courier"/>
-              </a:rPr>
-              <a:t>grpNew</a:t>
-            </a:r>
-            <a:r>
-              <a:rPr lang="en-US" sz="1400" dirty="0" smtClean="0">
-                <a:latin typeface="Courier"/>
-                <a:cs typeface="Courier"/>
-              </a:rPr>
-              <a:t>)</a:t>
-            </a:r>
-          </a:p>
-          <a:p>
-            <a:pPr marL="400050" lvl="1" indent="0">
-              <a:buNone/>
-            </a:pPr>
-            <a:r>
-              <a:rPr lang="en-US" sz="1400" dirty="0">
-                <a:latin typeface="Courier"/>
-                <a:cs typeface="Courier"/>
-              </a:rPr>
-              <a:t>e</a:t>
-            </a:r>
-            <a:r>
-              <a:rPr lang="en-US" sz="1400" dirty="0" smtClean="0">
-                <a:latin typeface="Courier"/>
-                <a:cs typeface="Courier"/>
-              </a:rPr>
-              <a:t>lse</a:t>
-            </a:r>
-          </a:p>
-          <a:p>
-            <a:pPr marL="400050" lvl="1" indent="0">
-              <a:buNone/>
-            </a:pPr>
-            <a:r>
-              <a:rPr lang="en-US" sz="1400" dirty="0" smtClean="0">
-                <a:latin typeface="Courier"/>
-                <a:cs typeface="Courier"/>
-              </a:rPr>
-              <a:t>	</a:t>
-            </a:r>
-            <a:r>
-              <a:rPr lang="en-US" sz="1400" dirty="0" err="1" smtClean="0">
-                <a:latin typeface="Courier"/>
-                <a:cs typeface="Courier"/>
-              </a:rPr>
-              <a:t>grpAll</a:t>
-            </a:r>
-            <a:r>
-              <a:rPr lang="en-US" sz="1400" i="1" dirty="0" smtClean="0">
-                <a:latin typeface="Courier"/>
-                <a:cs typeface="Courier"/>
-              </a:rPr>
-              <a:t> &lt;- add</a:t>
-            </a:r>
-            <a:r>
-              <a:rPr lang="en-US" sz="1400" dirty="0" smtClean="0">
-                <a:latin typeface="Courier"/>
-                <a:cs typeface="Courier"/>
-              </a:rPr>
-              <a:t>(</a:t>
-            </a:r>
-            <a:r>
-              <a:rPr lang="en-US" sz="1400" dirty="0" err="1" smtClean="0">
-                <a:latin typeface="Courier"/>
-                <a:cs typeface="Courier"/>
-              </a:rPr>
-              <a:t>grpTemp</a:t>
-            </a:r>
-            <a:r>
-              <a:rPr lang="en-US" sz="1400" dirty="0" smtClean="0">
-                <a:latin typeface="Courier"/>
-                <a:cs typeface="Courier"/>
-              </a:rPr>
-              <a:t>) </a:t>
-            </a:r>
-          </a:p>
-        </p:txBody>
-      </p:sp>
-      <p:sp>
-        <p:nvSpPr>
           <p:cNvPr id="4" name="Rectangle 3"/>
           <p:cNvSpPr/>
           <p:nvPr/>
@@ -8785,6 +8289,30 @@
           </a:p>
         </p:txBody>
       </p:sp>
+      <p:pic>
+        <p:nvPicPr>
+          <p:cNvPr id="5" name="Picture 4"/>
+          <p:cNvPicPr>
+            <a:picLocks noChangeAspect="1"/>
+          </p:cNvPicPr>
+          <p:nvPr/>
+        </p:nvPicPr>
+        <p:blipFill>
+          <a:blip r:embed="rId2"/>
+          <a:stretch>
+            <a:fillRect/>
+          </a:stretch>
+        </p:blipFill>
+        <p:spPr>
+          <a:xfrm>
+            <a:off x="609600" y="1447799"/>
+            <a:ext cx="6553200" cy="3731061"/>
+          </a:xfrm>
+          <a:prstGeom prst="rect">
+            <a:avLst/>
+          </a:prstGeom>
+        </p:spPr>
+      </p:pic>
     </p:spTree>
     <p:extLst>
       <p:ext uri="{BB962C8B-B14F-4D97-AF65-F5344CB8AC3E}">
@@ -10311,14 +9839,14 @@
           <a:effectLst/>
           <a:extLst>
             <a:ext uri="{909E8E84-426E-40dd-AFC4-6F175D3DCCD1}">
-              <a14:hiddenFill xmlns="" xmlns:a14="http://schemas.microsoft.com/office/drawing/2010/main">
+              <a14:hiddenFill xmlns:a14="http://schemas.microsoft.com/office/drawing/2010/main" xmlns="">
                 <a:solidFill>
                   <a:schemeClr val="accent1"/>
                 </a:solidFill>
               </a14:hiddenFill>
             </a:ext>
             <a:ext uri="{91240B29-F687-4f45-9708-019B960494DF}">
-              <a14:hiddenLine xmlns="" xmlns:a14="http://schemas.microsoft.com/office/drawing/2010/main" w="9525">
+              <a14:hiddenLine xmlns:a14="http://schemas.microsoft.com/office/drawing/2010/main" xmlns="" w="9525">
                 <a:solidFill>
                   <a:schemeClr val="tx1"/>
                 </a:solidFill>
@@ -10328,7 +9856,7 @@
               </a14:hiddenLine>
             </a:ext>
             <a:ext uri="{AF507438-7753-43e0-B8FC-AC1667EBCBE1}">
-              <a14:hiddenEffects xmlns="" xmlns:a14="http://schemas.microsoft.com/office/drawing/2010/main">
+              <a14:hiddenEffects xmlns:a14="http://schemas.microsoft.com/office/drawing/2010/main" xmlns="">
                 <a:effectLst>
                   <a:outerShdw blurRad="63500" dist="38099" dir="2700000" algn="ctr" rotWithShape="0">
                     <a:schemeClr val="bg2">
@@ -10339,7 +9867,7 @@
               </a14:hiddenEffects>
             </a:ext>
             <a:ext uri="{FAA26D3D-D897-4be2-8F04-BA451C77F1D7}">
-              <ma14:placeholderFlag xmlns="" xmlns:ma14="http://schemas.microsoft.com/office/mac/drawingml/2011/main" val="1"/>
+              <ma14:placeholderFlag xmlns:ma14="http://schemas.microsoft.com/office/mac/drawingml/2011/main" xmlns="" val="1"/>
             </a:ext>
           </a:extLst>
         </p:spPr>
@@ -10822,14 +10350,14 @@
           <a:effectLst/>
           <a:extLst>
             <a:ext uri="{909E8E84-426E-40dd-AFC4-6F175D3DCCD1}">
-              <a14:hiddenFill xmlns="" xmlns:a14="http://schemas.microsoft.com/office/drawing/2010/main">
+              <a14:hiddenFill xmlns:a14="http://schemas.microsoft.com/office/drawing/2010/main" xmlns="">
                 <a:solidFill>
                   <a:schemeClr val="accent1"/>
                 </a:solidFill>
               </a14:hiddenFill>
             </a:ext>
             <a:ext uri="{91240B29-F687-4f45-9708-019B960494DF}">
-              <a14:hiddenLine xmlns="" xmlns:a14="http://schemas.microsoft.com/office/drawing/2010/main" w="9525">
+              <a14:hiddenLine xmlns:a14="http://schemas.microsoft.com/office/drawing/2010/main" xmlns="" w="9525">
                 <a:solidFill>
                   <a:schemeClr val="tx1"/>
                 </a:solidFill>
@@ -10839,7 +10367,7 @@
               </a14:hiddenLine>
             </a:ext>
             <a:ext uri="{AF507438-7753-43e0-B8FC-AC1667EBCBE1}">
-              <a14:hiddenEffects xmlns="" xmlns:a14="http://schemas.microsoft.com/office/drawing/2010/main">
+              <a14:hiddenEffects xmlns:a14="http://schemas.microsoft.com/office/drawing/2010/main" xmlns="">
                 <a:effectLst>
                   <a:outerShdw blurRad="63500" dist="38099" dir="2700000" algn="ctr" rotWithShape="0">
                     <a:schemeClr val="bg2">
@@ -10850,7 +10378,7 @@
               </a14:hiddenEffects>
             </a:ext>
             <a:ext uri="{FAA26D3D-D897-4be2-8F04-BA451C77F1D7}">
-              <ma14:placeholderFlag xmlns="" xmlns:ma14="http://schemas.microsoft.com/office/mac/drawingml/2011/main" val="1"/>
+              <ma14:placeholderFlag xmlns:ma14="http://schemas.microsoft.com/office/mac/drawingml/2011/main" xmlns="" val="1"/>
             </a:ext>
           </a:extLst>
         </p:spPr>
@@ -11317,7 +10845,7 @@
         <a:effectLst/>
         <a:extLst>
           <a:ext uri="{AF507438-7753-43e0-B8FC-AC1667EBCBE1}">
-            <a14:hiddenEffects xmlns="" xmlns:a14="http://schemas.microsoft.com/office/drawing/2010/main">
+            <a14:hiddenEffects xmlns:a14="http://schemas.microsoft.com/office/drawing/2010/main" xmlns="">
               <a:effectLst>
                 <a:outerShdw blurRad="63500" dist="35921" dir="2700000" algn="ctr" rotWithShape="0">
                   <a:schemeClr val="bg2"/>
@@ -11391,7 +10919,7 @@
         <a:effectLst/>
         <a:extLst>
           <a:ext uri="{AF507438-7753-43e0-B8FC-AC1667EBCBE1}">
-            <a14:hiddenEffects xmlns="" xmlns:a14="http://schemas.microsoft.com/office/drawing/2010/main">
+            <a14:hiddenEffects xmlns:a14="http://schemas.microsoft.com/office/drawing/2010/main" xmlns="">
               <a:effectLst>
                 <a:outerShdw blurRad="63500" dist="35921" dir="2700000" algn="ctr" rotWithShape="0">
                   <a:schemeClr val="bg2"/>

</xml_diff>